<commit_message>
Added video to ppt
</commit_message>
<xml_diff>
--- a/Leap Presentation.pptx
+++ b/Leap Presentation.pptx
@@ -113,6 +113,22 @@
       </a:defRPr>
     </a:lvl9pPr>
   </p:defaultTextStyle>
+  <p:extLst>
+    <p:ext uri="{EFAFB233-063F-42B5-8137-9DF3F51BA10A}">
+      <p15:sldGuideLst xmlns:p15="http://schemas.microsoft.com/office/powerpoint/2012/main">
+        <p15:guide id="1" orient="horz" pos="2160">
+          <p15:clr>
+            <a:srgbClr val="A4A3A4"/>
+          </p15:clr>
+        </p15:guide>
+        <p15:guide id="2" pos="2880">
+          <p15:clr>
+            <a:srgbClr val="A4A3A4"/>
+          </p15:clr>
+        </p15:guide>
+      </p15:sldGuideLst>
+    </p:ext>
+  </p:extLst>
 </p:presentation>
 </file>
 
@@ -885,10 +901,9 @@
         <a:lstStyle/>
         <a:p>
           <a:r>
-            <a:rPr lang="en-US" dirty="0" smtClean="0"/>
+            <a:rPr lang="en-US" dirty="0"/>
             <a:t>Input Combination of Faces on Cube</a:t>
           </a:r>
-          <a:endParaRPr lang="en-US" dirty="0"/>
         </a:p>
       </dgm:t>
     </dgm:pt>
@@ -922,10 +937,9 @@
         <a:lstStyle/>
         <a:p>
           <a:r>
-            <a:rPr lang="en-US" dirty="0" smtClean="0"/>
+            <a:rPr lang="en-US" dirty="0"/>
             <a:t>Solving Algorithm</a:t>
           </a:r>
-          <a:endParaRPr lang="en-US" dirty="0"/>
         </a:p>
       </dgm:t>
     </dgm:pt>
@@ -959,10 +973,9 @@
         <a:lstStyle/>
         <a:p>
           <a:r>
-            <a:rPr lang="en-US" dirty="0" smtClean="0"/>
+            <a:rPr lang="en-US" dirty="0"/>
             <a:t>Array (list)</a:t>
           </a:r>
-          <a:endParaRPr lang="en-US" dirty="0"/>
         </a:p>
       </dgm:t>
     </dgm:pt>
@@ -996,16 +1009,15 @@
         <a:lstStyle/>
         <a:p>
           <a:r>
-            <a:rPr lang="en-US" dirty="0" smtClean="0"/>
+            <a:rPr lang="en-US" dirty="0"/>
             <a:t>Processing </a:t>
           </a:r>
         </a:p>
         <a:p>
           <a:r>
-            <a:rPr lang="en-US" dirty="0" smtClean="0"/>
+            <a:rPr lang="en-US" dirty="0"/>
             <a:t>(Move is translated into command)</a:t>
           </a:r>
-          <a:endParaRPr lang="en-US" dirty="0"/>
         </a:p>
       </dgm:t>
     </dgm:pt>
@@ -1039,10 +1051,9 @@
         <a:lstStyle/>
         <a:p>
           <a:r>
-            <a:rPr lang="en-US" dirty="0" smtClean="0"/>
+            <a:rPr lang="en-US" dirty="0"/>
             <a:t>Stepper Motor Turns Again</a:t>
           </a:r>
-          <a:endParaRPr lang="en-US" dirty="0"/>
         </a:p>
       </dgm:t>
     </dgm:pt>
@@ -1076,11 +1087,11 @@
         <a:lstStyle/>
         <a:p>
           <a:r>
-            <a:rPr lang="en-US" dirty="0" err="1" smtClean="0"/>
+            <a:rPr lang="en-US" dirty="0" err="1"/>
             <a:t>Arduino</a:t>
           </a:r>
           <a:r>
-            <a:rPr lang="en-US" dirty="0" smtClean="0"/>
+            <a:rPr lang="en-US" dirty="0"/>
             <a:t> Command Code</a:t>
           </a:r>
         </a:p>
@@ -1116,10 +1127,9 @@
         <a:lstStyle/>
         <a:p>
           <a:r>
-            <a:rPr lang="en-US" dirty="0" smtClean="0"/>
+            <a:rPr lang="en-US" dirty="0"/>
             <a:t>Stepper Motor Turns</a:t>
           </a:r>
-          <a:endParaRPr lang="en-US" dirty="0"/>
         </a:p>
       </dgm:t>
     </dgm:pt>
@@ -1153,10 +1163,9 @@
         <a:lstStyle/>
         <a:p>
           <a:r>
-            <a:rPr lang="en-US" dirty="0" smtClean="0"/>
+            <a:rPr lang="en-US" dirty="0"/>
             <a:t>Reads next move</a:t>
           </a:r>
-          <a:endParaRPr lang="en-US" dirty="0"/>
         </a:p>
       </dgm:t>
     </dgm:pt>
@@ -1190,10 +1199,9 @@
         <a:lstStyle/>
         <a:p>
           <a:r>
-            <a:rPr lang="en-US" dirty="0" smtClean="0"/>
+            <a:rPr lang="en-US" dirty="0"/>
             <a:t>Repeats Process until all moves are done and cube is solved</a:t>
           </a:r>
-          <a:endParaRPr lang="en-US" dirty="0"/>
         </a:p>
       </dgm:t>
     </dgm:pt>
@@ -1229,13 +1237,6 @@
         </dgm:presLayoutVars>
       </dgm:prSet>
       <dgm:spPr/>
-      <dgm:t>
-        <a:bodyPr/>
-        <a:lstStyle/>
-        <a:p>
-          <a:endParaRPr lang="en-US"/>
-        </a:p>
-      </dgm:t>
     </dgm:pt>
     <dgm:pt modelId="{88B6F5EB-3A87-46C9-9CE3-9446EC7EC7AB}" type="pres">
       <dgm:prSet presAssocID="{92B3F63F-2FC0-4670-8875-08029B51784D}" presName="sibTrans" presStyleLbl="bgSibTrans2D1" presStyleIdx="0" presStyleCnt="8"/>
@@ -1296,13 +1297,6 @@
         </dgm:presLayoutVars>
       </dgm:prSet>
       <dgm:spPr/>
-      <dgm:t>
-        <a:bodyPr/>
-        <a:lstStyle/>
-        <a:p>
-          <a:endParaRPr lang="en-US"/>
-        </a:p>
-      </dgm:t>
     </dgm:pt>
     <dgm:pt modelId="{C45D8CA4-3126-476A-9295-AB4788CBE736}" type="pres">
       <dgm:prSet presAssocID="{BB53C204-BFAD-4D7D-811C-8AE49307800F}" presName="sibTrans" presStyleLbl="bgSibTrans2D1" presStyleIdx="3" presStyleCnt="8"/>
@@ -1323,13 +1317,6 @@
         </dgm:presLayoutVars>
       </dgm:prSet>
       <dgm:spPr/>
-      <dgm:t>
-        <a:bodyPr/>
-        <a:lstStyle/>
-        <a:p>
-          <a:endParaRPr lang="en-US"/>
-        </a:p>
-      </dgm:t>
     </dgm:pt>
     <dgm:pt modelId="{FDCF76C1-17ED-4EC9-A900-7130F9E67C2A}" type="pres">
       <dgm:prSet presAssocID="{E06DE743-F356-4426-A555-52BAAD1503E9}" presName="sibTrans" presStyleLbl="bgSibTrans2D1" presStyleIdx="4" presStyleCnt="8"/>
@@ -1350,13 +1337,6 @@
         </dgm:presLayoutVars>
       </dgm:prSet>
       <dgm:spPr/>
-      <dgm:t>
-        <a:bodyPr/>
-        <a:lstStyle/>
-        <a:p>
-          <a:endParaRPr lang="en-US"/>
-        </a:p>
-      </dgm:t>
     </dgm:pt>
     <dgm:pt modelId="{7B18A560-908B-4479-B201-023E19D3CE4F}" type="pres">
       <dgm:prSet presAssocID="{B08F190B-3FE0-4178-8524-699A4814C976}" presName="sibTrans" presStyleLbl="bgSibTrans2D1" presStyleIdx="5" presStyleCnt="8"/>
@@ -1397,13 +1377,6 @@
         </dgm:presLayoutVars>
       </dgm:prSet>
       <dgm:spPr/>
-      <dgm:t>
-        <a:bodyPr/>
-        <a:lstStyle/>
-        <a:p>
-          <a:endParaRPr lang="en-US"/>
-        </a:p>
-      </dgm:t>
     </dgm:pt>
     <dgm:pt modelId="{0820BC7F-BB34-4E12-A0CA-BD65E64E9C82}" type="pres">
       <dgm:prSet presAssocID="{A7170900-9879-4C50-992B-11E8F53FF7BE}" presName="sibTrans" presStyleLbl="bgSibTrans2D1" presStyleIdx="7" presStyleCnt="8"/>
@@ -1424,43 +1397,36 @@
         </dgm:presLayoutVars>
       </dgm:prSet>
       <dgm:spPr/>
-      <dgm:t>
-        <a:bodyPr/>
-        <a:lstStyle/>
-        <a:p>
-          <a:endParaRPr lang="en-US"/>
-        </a:p>
-      </dgm:t>
     </dgm:pt>
   </dgm:ptLst>
   <dgm:cxnLst>
+    <dgm:cxn modelId="{7DC19E16-37ED-45B3-AA9A-71B98D3370F3}" srcId="{F2DC3B41-3954-46AD-B9E1-317FC4E3DC0B}" destId="{38BF9E12-E0FE-43F4-9E72-706803A8FB0A}" srcOrd="0" destOrd="0" parTransId="{EE17E969-D2AB-44DB-A64A-4D796D999076}" sibTransId="{92B3F63F-2FC0-4670-8875-08029B51784D}"/>
+    <dgm:cxn modelId="{8B032C23-FAF8-49C3-A784-EC2DFA41F66A}" type="presOf" srcId="{252040F3-CB71-471B-BBE0-A39BA0872A07}" destId="{726D62A7-DE15-47AE-9BCF-AC2E846C7948}" srcOrd="0" destOrd="0" presId="urn:microsoft.com/office/officeart/2005/8/layout/bProcess4"/>
+    <dgm:cxn modelId="{8577A917-83C5-404F-AF2D-546508AF4E7A}" type="presOf" srcId="{B9B33B56-2075-4360-B737-2633882EB139}" destId="{EE50C488-6C46-4340-B997-C0B82FA1E322}" srcOrd="0" destOrd="0" presId="urn:microsoft.com/office/officeart/2005/8/layout/bProcess4"/>
+    <dgm:cxn modelId="{EFFFFA5E-27FF-4647-BBED-910DB8414084}" type="presOf" srcId="{A7170900-9879-4C50-992B-11E8F53FF7BE}" destId="{0820BC7F-BB34-4E12-A0CA-BD65E64E9C82}" srcOrd="0" destOrd="0" presId="urn:microsoft.com/office/officeart/2005/8/layout/bProcess4"/>
+    <dgm:cxn modelId="{5624D629-0554-41A8-8BB9-B71312E3BA30}" type="presOf" srcId="{38BF9E12-E0FE-43F4-9E72-706803A8FB0A}" destId="{A8CE49C6-E731-4F4B-AB5B-1696952EC1BE}" srcOrd="0" destOrd="0" presId="urn:microsoft.com/office/officeart/2005/8/layout/bProcess4"/>
+    <dgm:cxn modelId="{D2349B35-926C-444E-AC4C-BC98CE2FF5FE}" type="presOf" srcId="{92B3F63F-2FC0-4670-8875-08029B51784D}" destId="{88B6F5EB-3A87-46C9-9CE3-9446EC7EC7AB}" srcOrd="0" destOrd="0" presId="urn:microsoft.com/office/officeart/2005/8/layout/bProcess4"/>
+    <dgm:cxn modelId="{BA074312-19BD-4CE8-A805-047F5E6301CA}" type="presOf" srcId="{3FC4E43D-3782-4F8E-A881-EB8B2842CAD9}" destId="{68AE7271-8DD4-458D-A824-FCECA2A9A093}" srcOrd="0" destOrd="0" presId="urn:microsoft.com/office/officeart/2005/8/layout/bProcess4"/>
+    <dgm:cxn modelId="{FBB26020-15D4-40C5-928F-C858EE62D0C8}" type="presOf" srcId="{778EA7D6-0D1C-468A-BD36-FDBB25F27B54}" destId="{860429DE-097C-43F0-90FA-60237F5E3952}" srcOrd="0" destOrd="0" presId="urn:microsoft.com/office/officeart/2005/8/layout/bProcess4"/>
+    <dgm:cxn modelId="{34CC078A-CB5A-4D39-9AE0-1E2CC63E00C9}" type="presOf" srcId="{55094E42-1063-4788-80F4-CB639EEB34AD}" destId="{6C00F6E6-5579-4412-BF8A-09111BFBE9F0}" srcOrd="0" destOrd="0" presId="urn:microsoft.com/office/officeart/2005/8/layout/bProcess4"/>
+    <dgm:cxn modelId="{E8FFBB6F-C72D-4F6F-9867-3E95EB83C887}" type="presOf" srcId="{170ABF72-C70A-461D-9820-4F8ECA519F5D}" destId="{14CD1DDB-5FDD-4F7D-AC92-3D8BF0D90F17}" srcOrd="0" destOrd="0" presId="urn:microsoft.com/office/officeart/2005/8/layout/bProcess4"/>
+    <dgm:cxn modelId="{B1CF79E8-BC2B-4779-98BA-8FBB8350988C}" type="presOf" srcId="{F2DC3B41-3954-46AD-B9E1-317FC4E3DC0B}" destId="{E188BAB3-33F2-4516-8E9B-8C0AB98CB56A}" srcOrd="0" destOrd="0" presId="urn:microsoft.com/office/officeart/2005/8/layout/bProcess4"/>
+    <dgm:cxn modelId="{B47301D8-6593-443E-82C3-3E30DA2B58A0}" srcId="{F2DC3B41-3954-46AD-B9E1-317FC4E3DC0B}" destId="{170ABF72-C70A-461D-9820-4F8ECA519F5D}" srcOrd="5" destOrd="0" parTransId="{CF742C23-AF91-4B4B-A9D6-B46A64FF6F5A}" sibTransId="{B08F190B-3FE0-4178-8524-699A4814C976}"/>
+    <dgm:cxn modelId="{254B54AF-839E-4286-A3B8-5986678D321D}" srcId="{F2DC3B41-3954-46AD-B9E1-317FC4E3DC0B}" destId="{4F31D32B-2EE6-497A-BF30-A39DD504E221}" srcOrd="8" destOrd="0" parTransId="{9247A383-67D5-4DD7-BC0B-7ADA83C40FFD}" sibTransId="{C1CD507F-2A22-4DD0-AA1C-257869A874C6}"/>
+    <dgm:cxn modelId="{6B23B41B-E363-42E4-989D-9AAE42ED04AE}" srcId="{F2DC3B41-3954-46AD-B9E1-317FC4E3DC0B}" destId="{55094E42-1063-4788-80F4-CB639EEB34AD}" srcOrd="3" destOrd="0" parTransId="{DD872D16-8F67-49A6-B905-52A7E7CE2189}" sibTransId="{BB53C204-BFAD-4D7D-811C-8AE49307800F}"/>
+    <dgm:cxn modelId="{E6EBB2D8-69F3-41D9-97BC-328E9534F50D}" srcId="{F2DC3B41-3954-46AD-B9E1-317FC4E3DC0B}" destId="{036913AB-EA6E-4EBC-831E-E79FADCEAFAC}" srcOrd="2" destOrd="0" parTransId="{967C6132-8894-4D9D-857C-665D4EB91759}" sibTransId="{19A99A5A-B1CE-47EB-A46B-DBFCF5B68D9F}"/>
+    <dgm:cxn modelId="{B430CCAA-D4C1-45B4-8B73-19FC59C98E86}" srcId="{F2DC3B41-3954-46AD-B9E1-317FC4E3DC0B}" destId="{919D051C-9380-4A23-897E-2504ADB7AFCD}" srcOrd="7" destOrd="0" parTransId="{8F4942DF-9C14-42E5-8ED5-9FB84CA54275}" sibTransId="{A7170900-9879-4C50-992B-11E8F53FF7BE}"/>
+    <dgm:cxn modelId="{4D0AF89F-A058-41E1-BDDB-685AC05D3488}" type="presOf" srcId="{19A99A5A-B1CE-47EB-A46B-DBFCF5B68D9F}" destId="{C2E2847E-32A5-4EEE-9CD8-9A96FF55F3E1}" srcOrd="0" destOrd="0" presId="urn:microsoft.com/office/officeart/2005/8/layout/bProcess4"/>
     <dgm:cxn modelId="{68A399CB-6BD9-4B84-B50C-A6764923CBA2}" type="presOf" srcId="{4F31D32B-2EE6-497A-BF30-A39DD504E221}" destId="{C3F616F6-87F1-4314-A8F6-477B8211574A}" srcOrd="0" destOrd="0" presId="urn:microsoft.com/office/officeart/2005/8/layout/bProcess4"/>
+    <dgm:cxn modelId="{280FF570-66C4-4019-8C6C-3B6067435F36}" type="presOf" srcId="{5B36AAFB-828B-4D8C-B388-4AC8D5E52ED7}" destId="{6649AB1C-8B65-4127-8A41-6DED1AFA1914}" srcOrd="0" destOrd="0" presId="urn:microsoft.com/office/officeart/2005/8/layout/bProcess4"/>
     <dgm:cxn modelId="{C94E0003-3E9D-4C4B-9FB0-7EAF73437F9E}" srcId="{F2DC3B41-3954-46AD-B9E1-317FC4E3DC0B}" destId="{3FC4E43D-3782-4F8E-A881-EB8B2842CAD9}" srcOrd="4" destOrd="0" parTransId="{A0F6AA2E-CAAF-4F3F-9C34-CB5F6DAF3B7B}" sibTransId="{E06DE743-F356-4426-A555-52BAAD1503E9}"/>
-    <dgm:cxn modelId="{B430CCAA-D4C1-45B4-8B73-19FC59C98E86}" srcId="{F2DC3B41-3954-46AD-B9E1-317FC4E3DC0B}" destId="{919D051C-9380-4A23-897E-2504ADB7AFCD}" srcOrd="7" destOrd="0" parTransId="{8F4942DF-9C14-42E5-8ED5-9FB84CA54275}" sibTransId="{A7170900-9879-4C50-992B-11E8F53FF7BE}"/>
-    <dgm:cxn modelId="{6B23B41B-E363-42E4-989D-9AAE42ED04AE}" srcId="{F2DC3B41-3954-46AD-B9E1-317FC4E3DC0B}" destId="{55094E42-1063-4788-80F4-CB639EEB34AD}" srcOrd="3" destOrd="0" parTransId="{DD872D16-8F67-49A6-B905-52A7E7CE2189}" sibTransId="{BB53C204-BFAD-4D7D-811C-8AE49307800F}"/>
-    <dgm:cxn modelId="{4D0AF89F-A058-41E1-BDDB-685AC05D3488}" type="presOf" srcId="{19A99A5A-B1CE-47EB-A46B-DBFCF5B68D9F}" destId="{C2E2847E-32A5-4EEE-9CD8-9A96FF55F3E1}" srcOrd="0" destOrd="0" presId="urn:microsoft.com/office/officeart/2005/8/layout/bProcess4"/>
+    <dgm:cxn modelId="{587B11B6-DEC8-4DB5-95C4-D5C3C653644E}" type="presOf" srcId="{B08F190B-3FE0-4178-8524-699A4814C976}" destId="{7B18A560-908B-4479-B201-023E19D3CE4F}" srcOrd="0" destOrd="0" presId="urn:microsoft.com/office/officeart/2005/8/layout/bProcess4"/>
+    <dgm:cxn modelId="{509A1162-57D6-47E5-944C-42890F9F84BC}" srcId="{F2DC3B41-3954-46AD-B9E1-317FC4E3DC0B}" destId="{252040F3-CB71-471B-BBE0-A39BA0872A07}" srcOrd="1" destOrd="0" parTransId="{6CEF4554-E905-4C15-BD9F-9C8D45A272EE}" sibTransId="{B9B33B56-2075-4360-B737-2633882EB139}"/>
+    <dgm:cxn modelId="{E4294391-FDC8-4948-91C2-16DBBBB58B18}" type="presOf" srcId="{E06DE743-F356-4426-A555-52BAAD1503E9}" destId="{FDCF76C1-17ED-4EC9-A900-7130F9E67C2A}" srcOrd="0" destOrd="0" presId="urn:microsoft.com/office/officeart/2005/8/layout/bProcess4"/>
     <dgm:cxn modelId="{5E48EBA1-4BE2-42FC-B5E7-626C1203D3FC}" type="presOf" srcId="{919D051C-9380-4A23-897E-2504ADB7AFCD}" destId="{DF635EFE-B76A-4517-A00C-077CB1B9BEC5}" srcOrd="0" destOrd="0" presId="urn:microsoft.com/office/officeart/2005/8/layout/bProcess4"/>
-    <dgm:cxn modelId="{8B032C23-FAF8-49C3-A784-EC2DFA41F66A}" type="presOf" srcId="{252040F3-CB71-471B-BBE0-A39BA0872A07}" destId="{726D62A7-DE15-47AE-9BCF-AC2E846C7948}" srcOrd="0" destOrd="0" presId="urn:microsoft.com/office/officeart/2005/8/layout/bProcess4"/>
-    <dgm:cxn modelId="{5624D629-0554-41A8-8BB9-B71312E3BA30}" type="presOf" srcId="{38BF9E12-E0FE-43F4-9E72-706803A8FB0A}" destId="{A8CE49C6-E731-4F4B-AB5B-1696952EC1BE}" srcOrd="0" destOrd="0" presId="urn:microsoft.com/office/officeart/2005/8/layout/bProcess4"/>
-    <dgm:cxn modelId="{B1CF79E8-BC2B-4779-98BA-8FBB8350988C}" type="presOf" srcId="{F2DC3B41-3954-46AD-B9E1-317FC4E3DC0B}" destId="{E188BAB3-33F2-4516-8E9B-8C0AB98CB56A}" srcOrd="0" destOrd="0" presId="urn:microsoft.com/office/officeart/2005/8/layout/bProcess4"/>
-    <dgm:cxn modelId="{8577A917-83C5-404F-AF2D-546508AF4E7A}" type="presOf" srcId="{B9B33B56-2075-4360-B737-2633882EB139}" destId="{EE50C488-6C46-4340-B997-C0B82FA1E322}" srcOrd="0" destOrd="0" presId="urn:microsoft.com/office/officeart/2005/8/layout/bProcess4"/>
-    <dgm:cxn modelId="{280FF570-66C4-4019-8C6C-3B6067435F36}" type="presOf" srcId="{5B36AAFB-828B-4D8C-B388-4AC8D5E52ED7}" destId="{6649AB1C-8B65-4127-8A41-6DED1AFA1914}" srcOrd="0" destOrd="0" presId="urn:microsoft.com/office/officeart/2005/8/layout/bProcess4"/>
-    <dgm:cxn modelId="{E4294391-FDC8-4948-91C2-16DBBBB58B18}" type="presOf" srcId="{E06DE743-F356-4426-A555-52BAAD1503E9}" destId="{FDCF76C1-17ED-4EC9-A900-7130F9E67C2A}" srcOrd="0" destOrd="0" presId="urn:microsoft.com/office/officeart/2005/8/layout/bProcess4"/>
-    <dgm:cxn modelId="{B47301D8-6593-443E-82C3-3E30DA2B58A0}" srcId="{F2DC3B41-3954-46AD-B9E1-317FC4E3DC0B}" destId="{170ABF72-C70A-461D-9820-4F8ECA519F5D}" srcOrd="5" destOrd="0" parTransId="{CF742C23-AF91-4B4B-A9D6-B46A64FF6F5A}" sibTransId="{B08F190B-3FE0-4178-8524-699A4814C976}"/>
-    <dgm:cxn modelId="{D2349B35-926C-444E-AC4C-BC98CE2FF5FE}" type="presOf" srcId="{92B3F63F-2FC0-4670-8875-08029B51784D}" destId="{88B6F5EB-3A87-46C9-9CE3-9446EC7EC7AB}" srcOrd="0" destOrd="0" presId="urn:microsoft.com/office/officeart/2005/8/layout/bProcess4"/>
-    <dgm:cxn modelId="{7DC19E16-37ED-45B3-AA9A-71B98D3370F3}" srcId="{F2DC3B41-3954-46AD-B9E1-317FC4E3DC0B}" destId="{38BF9E12-E0FE-43F4-9E72-706803A8FB0A}" srcOrd="0" destOrd="0" parTransId="{EE17E969-D2AB-44DB-A64A-4D796D999076}" sibTransId="{92B3F63F-2FC0-4670-8875-08029B51784D}"/>
-    <dgm:cxn modelId="{34CC078A-CB5A-4D39-9AE0-1E2CC63E00C9}" type="presOf" srcId="{55094E42-1063-4788-80F4-CB639EEB34AD}" destId="{6C00F6E6-5579-4412-BF8A-09111BFBE9F0}" srcOrd="0" destOrd="0" presId="urn:microsoft.com/office/officeart/2005/8/layout/bProcess4"/>
-    <dgm:cxn modelId="{E6EBB2D8-69F3-41D9-97BC-328E9534F50D}" srcId="{F2DC3B41-3954-46AD-B9E1-317FC4E3DC0B}" destId="{036913AB-EA6E-4EBC-831E-E79FADCEAFAC}" srcOrd="2" destOrd="0" parTransId="{967C6132-8894-4D9D-857C-665D4EB91759}" sibTransId="{19A99A5A-B1CE-47EB-A46B-DBFCF5B68D9F}"/>
-    <dgm:cxn modelId="{E8FFBB6F-C72D-4F6F-9867-3E95EB83C887}" type="presOf" srcId="{170ABF72-C70A-461D-9820-4F8ECA519F5D}" destId="{14CD1DDB-5FDD-4F7D-AC92-3D8BF0D90F17}" srcOrd="0" destOrd="0" presId="urn:microsoft.com/office/officeart/2005/8/layout/bProcess4"/>
-    <dgm:cxn modelId="{FBB26020-15D4-40C5-928F-C858EE62D0C8}" type="presOf" srcId="{778EA7D6-0D1C-468A-BD36-FDBB25F27B54}" destId="{860429DE-097C-43F0-90FA-60237F5E3952}" srcOrd="0" destOrd="0" presId="urn:microsoft.com/office/officeart/2005/8/layout/bProcess4"/>
-    <dgm:cxn modelId="{BA074312-19BD-4CE8-A805-047F5E6301CA}" type="presOf" srcId="{3FC4E43D-3782-4F8E-A881-EB8B2842CAD9}" destId="{68AE7271-8DD4-458D-A824-FCECA2A9A093}" srcOrd="0" destOrd="0" presId="urn:microsoft.com/office/officeart/2005/8/layout/bProcess4"/>
+    <dgm:cxn modelId="{F1EEEA40-69D7-4AC3-826C-7AF6DA06C641}" type="presOf" srcId="{BB53C204-BFAD-4D7D-811C-8AE49307800F}" destId="{C45D8CA4-3126-476A-9295-AB4788CBE736}" srcOrd="0" destOrd="0" presId="urn:microsoft.com/office/officeart/2005/8/layout/bProcess4"/>
+    <dgm:cxn modelId="{6DEF942C-B697-4FC5-9A7E-D14B5EF59680}" type="presOf" srcId="{036913AB-EA6E-4EBC-831E-E79FADCEAFAC}" destId="{E996A43A-29D8-497F-AE34-77303023783F}" srcOrd="0" destOrd="0" presId="urn:microsoft.com/office/officeart/2005/8/layout/bProcess4"/>
     <dgm:cxn modelId="{59BF9CC1-86D6-4B62-A4A0-26092F688F6E}" srcId="{F2DC3B41-3954-46AD-B9E1-317FC4E3DC0B}" destId="{5B36AAFB-828B-4D8C-B388-4AC8D5E52ED7}" srcOrd="6" destOrd="0" parTransId="{3FCBB275-7163-4F10-8EFC-9B38CFDF3016}" sibTransId="{778EA7D6-0D1C-468A-BD36-FDBB25F27B54}"/>
-    <dgm:cxn modelId="{254B54AF-839E-4286-A3B8-5986678D321D}" srcId="{F2DC3B41-3954-46AD-B9E1-317FC4E3DC0B}" destId="{4F31D32B-2EE6-497A-BF30-A39DD504E221}" srcOrd="8" destOrd="0" parTransId="{9247A383-67D5-4DD7-BC0B-7ADA83C40FFD}" sibTransId="{C1CD507F-2A22-4DD0-AA1C-257869A874C6}"/>
-    <dgm:cxn modelId="{6DEF942C-B697-4FC5-9A7E-D14B5EF59680}" type="presOf" srcId="{036913AB-EA6E-4EBC-831E-E79FADCEAFAC}" destId="{E996A43A-29D8-497F-AE34-77303023783F}" srcOrd="0" destOrd="0" presId="urn:microsoft.com/office/officeart/2005/8/layout/bProcess4"/>
-    <dgm:cxn modelId="{F1EEEA40-69D7-4AC3-826C-7AF6DA06C641}" type="presOf" srcId="{BB53C204-BFAD-4D7D-811C-8AE49307800F}" destId="{C45D8CA4-3126-476A-9295-AB4788CBE736}" srcOrd="0" destOrd="0" presId="urn:microsoft.com/office/officeart/2005/8/layout/bProcess4"/>
-    <dgm:cxn modelId="{EFFFFA5E-27FF-4647-BBED-910DB8414084}" type="presOf" srcId="{A7170900-9879-4C50-992B-11E8F53FF7BE}" destId="{0820BC7F-BB34-4E12-A0CA-BD65E64E9C82}" srcOrd="0" destOrd="0" presId="urn:microsoft.com/office/officeart/2005/8/layout/bProcess4"/>
-    <dgm:cxn modelId="{509A1162-57D6-47E5-944C-42890F9F84BC}" srcId="{F2DC3B41-3954-46AD-B9E1-317FC4E3DC0B}" destId="{252040F3-CB71-471B-BBE0-A39BA0872A07}" srcOrd="1" destOrd="0" parTransId="{6CEF4554-E905-4C15-BD9F-9C8D45A272EE}" sibTransId="{B9B33B56-2075-4360-B737-2633882EB139}"/>
-    <dgm:cxn modelId="{587B11B6-DEC8-4DB5-95C4-D5C3C653644E}" type="presOf" srcId="{B08F190B-3FE0-4178-8524-699A4814C976}" destId="{7B18A560-908B-4479-B201-023E19D3CE4F}" srcOrd="0" destOrd="0" presId="urn:microsoft.com/office/officeart/2005/8/layout/bProcess4"/>
     <dgm:cxn modelId="{10F31B6E-1012-442E-85DC-B36A7A84CD64}" type="presParOf" srcId="{E188BAB3-33F2-4516-8E9B-8C0AB98CB56A}" destId="{5FBF2256-2B77-47D6-BBEC-DC4D12EB3B22}" srcOrd="0" destOrd="0" presId="urn:microsoft.com/office/officeart/2005/8/layout/bProcess4"/>
     <dgm:cxn modelId="{1FD22F9B-5E6A-4673-A2FD-113FD976E839}" type="presParOf" srcId="{5FBF2256-2B77-47D6-BBEC-DC4D12EB3B22}" destId="{B392AE9E-9E05-4CFD-BD47-7541EF907C8C}" srcOrd="0" destOrd="0" presId="urn:microsoft.com/office/officeart/2005/8/layout/bProcess4"/>
     <dgm:cxn modelId="{7A59A5CD-F310-40EA-A4DE-7186E602EB5F}" type="presParOf" srcId="{5FBF2256-2B77-47D6-BBEC-DC4D12EB3B22}" destId="{A8CE49C6-E731-4F4B-AB5B-1696952EC1BE}" srcOrd="1" destOrd="0" presId="urn:microsoft.com/office/officeart/2005/8/layout/bProcess4"/>
@@ -1501,14 +1467,14 @@
   <dgm:whole/>
   <dgm:extLst>
     <a:ext uri="http://schemas.microsoft.com/office/drawing/2008/diagram">
-      <dsp:dataModelExt xmlns:dsp="http://schemas.microsoft.com/office/drawing/2008/diagram" xmlns="" relId="rId6" minVer="http://schemas.openxmlformats.org/drawingml/2006/diagram"/>
+      <dsp:dataModelExt xmlns:dsp="http://schemas.microsoft.com/office/drawing/2008/diagram" relId="rId6" minVer="http://schemas.openxmlformats.org/drawingml/2006/diagram"/>
     </a:ext>
   </dgm:extLst>
 </dgm:dataModel>
 </file>
 
 <file path=ppt/diagrams/drawing1.xml><?xml version="1.0" encoding="utf-8"?>
-<dsp:drawing xmlns:dgm="http://schemas.openxmlformats.org/drawingml/2006/diagram" xmlns:a="http://schemas.openxmlformats.org/drawingml/2006/main" xmlns:dsp="http://schemas.microsoft.com/office/drawing/2008/diagram">
+<dsp:drawing xmlns:dgm="http://schemas.openxmlformats.org/drawingml/2006/diagram" xmlns:dsp="http://schemas.microsoft.com/office/drawing/2008/diagram" xmlns:a="http://schemas.openxmlformats.org/drawingml/2006/main">
   <dsp:spTree>
     <dsp:nvGrpSpPr>
       <dsp:cNvPr id="0" name=""/>
@@ -1613,7 +1579,7 @@
         </a:bodyPr>
         <a:lstStyle/>
         <a:p>
-          <a:pPr lvl="0" algn="ctr" defTabSz="800100">
+          <a:pPr marL="0" lvl="0" indent="0" algn="ctr" defTabSz="800100">
             <a:lnSpc>
               <a:spcPct val="90000"/>
             </a:lnSpc>
@@ -1623,17 +1589,17 @@
             <a:spcAft>
               <a:spcPct val="35000"/>
             </a:spcAft>
+            <a:buNone/>
           </a:pPr>
           <a:r>
-            <a:rPr lang="en-US" sz="1800" kern="1200" dirty="0" smtClean="0"/>
+            <a:rPr lang="en-US" sz="1800" kern="1200" dirty="0"/>
             <a:t>Input Combination of Faces on Cube</a:t>
           </a:r>
-          <a:endParaRPr lang="en-US" sz="1800" kern="1200" dirty="0"/>
         </a:p>
       </dsp:txBody>
       <dsp:txXfrm>
-        <a:off x="290929" y="694"/>
-        <a:ext cx="2089546" cy="1253728"/>
+        <a:off x="327649" y="37414"/>
+        <a:ext cx="2016106" cy="1180288"/>
       </dsp:txXfrm>
     </dsp:sp>
     <dsp:sp modelId="{EE50C488-6C46-4340-B997-C0B82FA1E322}">
@@ -1734,7 +1700,7 @@
         </a:bodyPr>
         <a:lstStyle/>
         <a:p>
-          <a:pPr lvl="0" algn="ctr" defTabSz="800100">
+          <a:pPr marL="0" lvl="0" indent="0" algn="ctr" defTabSz="800100">
             <a:lnSpc>
               <a:spcPct val="90000"/>
             </a:lnSpc>
@@ -1744,17 +1710,17 @@
             <a:spcAft>
               <a:spcPct val="35000"/>
             </a:spcAft>
+            <a:buNone/>
           </a:pPr>
           <a:r>
-            <a:rPr lang="en-US" sz="1800" kern="1200" dirty="0" smtClean="0"/>
+            <a:rPr lang="en-US" sz="1800" kern="1200" dirty="0"/>
             <a:t>Solving Algorithm</a:t>
           </a:r>
-          <a:endParaRPr lang="en-US" sz="1800" kern="1200" dirty="0"/>
         </a:p>
       </dsp:txBody>
       <dsp:txXfrm>
-        <a:off x="290929" y="1567854"/>
-        <a:ext cx="2089546" cy="1253728"/>
+        <a:off x="327649" y="1604574"/>
+        <a:ext cx="2016106" cy="1180288"/>
       </dsp:txXfrm>
     </dsp:sp>
     <dsp:sp modelId="{C2E2847E-32A5-4EEE-9CD8-9A96FF55F3E1}">
@@ -1855,7 +1821,7 @@
         </a:bodyPr>
         <a:lstStyle/>
         <a:p>
-          <a:pPr lvl="0" algn="ctr" defTabSz="800100">
+          <a:pPr marL="0" lvl="0" indent="0" algn="ctr" defTabSz="800100">
             <a:lnSpc>
               <a:spcPct val="90000"/>
             </a:lnSpc>
@@ -1865,17 +1831,17 @@
             <a:spcAft>
               <a:spcPct val="35000"/>
             </a:spcAft>
+            <a:buNone/>
           </a:pPr>
           <a:r>
-            <a:rPr lang="en-US" sz="1800" kern="1200" dirty="0" smtClean="0"/>
+            <a:rPr lang="en-US" sz="1800" kern="1200" dirty="0"/>
             <a:t>Array (list)</a:t>
           </a:r>
-          <a:endParaRPr lang="en-US" sz="1800" kern="1200" dirty="0"/>
         </a:p>
       </dsp:txBody>
       <dsp:txXfrm>
-        <a:off x="290929" y="3135014"/>
-        <a:ext cx="2089546" cy="1253728"/>
+        <a:off x="327649" y="3171734"/>
+        <a:ext cx="2016106" cy="1180288"/>
       </dsp:txXfrm>
     </dsp:sp>
     <dsp:sp modelId="{C45D8CA4-3126-476A-9295-AB4788CBE736}">
@@ -1976,7 +1942,7 @@
         </a:bodyPr>
         <a:lstStyle/>
         <a:p>
-          <a:pPr lvl="0" algn="ctr" defTabSz="800100">
+          <a:pPr marL="0" lvl="0" indent="0" algn="ctr" defTabSz="800100">
             <a:lnSpc>
               <a:spcPct val="90000"/>
             </a:lnSpc>
@@ -1986,14 +1952,15 @@
             <a:spcAft>
               <a:spcPct val="35000"/>
             </a:spcAft>
+            <a:buNone/>
           </a:pPr>
           <a:r>
-            <a:rPr lang="en-US" sz="1800" kern="1200" dirty="0" smtClean="0"/>
+            <a:rPr lang="en-US" sz="1800" kern="1200" dirty="0"/>
             <a:t>Processing </a:t>
           </a:r>
         </a:p>
         <a:p>
-          <a:pPr lvl="0" algn="ctr" defTabSz="800100">
+          <a:pPr marL="0" lvl="0" indent="0" algn="ctr" defTabSz="800100">
             <a:lnSpc>
               <a:spcPct val="90000"/>
             </a:lnSpc>
@@ -2003,17 +1970,17 @@
             <a:spcAft>
               <a:spcPct val="35000"/>
             </a:spcAft>
+            <a:buNone/>
           </a:pPr>
           <a:r>
-            <a:rPr lang="en-US" sz="1800" kern="1200" dirty="0" smtClean="0"/>
+            <a:rPr lang="en-US" sz="1800" kern="1200" dirty="0"/>
             <a:t>(Move is translated into command)</a:t>
           </a:r>
-          <a:endParaRPr lang="en-US" sz="1800" kern="1200" dirty="0"/>
         </a:p>
       </dsp:txBody>
       <dsp:txXfrm>
-        <a:off x="3070026" y="3135014"/>
-        <a:ext cx="2089546" cy="1253728"/>
+        <a:off x="3106746" y="3171734"/>
+        <a:ext cx="2016106" cy="1180288"/>
       </dsp:txXfrm>
     </dsp:sp>
     <dsp:sp modelId="{FDCF76C1-17ED-4EC9-A900-7130F9E67C2A}">
@@ -2114,7 +2081,7 @@
         </a:bodyPr>
         <a:lstStyle/>
         <a:p>
-          <a:pPr lvl="0" algn="ctr" defTabSz="800100">
+          <a:pPr marL="0" lvl="0" indent="0" algn="ctr" defTabSz="800100">
             <a:lnSpc>
               <a:spcPct val="90000"/>
             </a:lnSpc>
@@ -2124,20 +2091,21 @@
             <a:spcAft>
               <a:spcPct val="35000"/>
             </a:spcAft>
+            <a:buNone/>
           </a:pPr>
           <a:r>
-            <a:rPr lang="en-US" sz="1800" kern="1200" dirty="0" err="1" smtClean="0"/>
+            <a:rPr lang="en-US" sz="1800" kern="1200" dirty="0" err="1"/>
             <a:t>Arduino</a:t>
           </a:r>
           <a:r>
-            <a:rPr lang="en-US" sz="1800" kern="1200" dirty="0" smtClean="0"/>
+            <a:rPr lang="en-US" sz="1800" kern="1200" dirty="0"/>
             <a:t> Command Code</a:t>
           </a:r>
         </a:p>
       </dsp:txBody>
       <dsp:txXfrm>
-        <a:off x="3070026" y="1567854"/>
-        <a:ext cx="2089546" cy="1253728"/>
+        <a:off x="3106746" y="1604574"/>
+        <a:ext cx="2016106" cy="1180288"/>
       </dsp:txXfrm>
     </dsp:sp>
     <dsp:sp modelId="{7B18A560-908B-4479-B201-023E19D3CE4F}">
@@ -2238,7 +2206,7 @@
         </a:bodyPr>
         <a:lstStyle/>
         <a:p>
-          <a:pPr lvl="0" algn="ctr" defTabSz="800100">
+          <a:pPr marL="0" lvl="0" indent="0" algn="ctr" defTabSz="800100">
             <a:lnSpc>
               <a:spcPct val="90000"/>
             </a:lnSpc>
@@ -2248,17 +2216,17 @@
             <a:spcAft>
               <a:spcPct val="35000"/>
             </a:spcAft>
+            <a:buNone/>
           </a:pPr>
           <a:r>
-            <a:rPr lang="en-US" sz="1800" kern="1200" dirty="0" smtClean="0"/>
+            <a:rPr lang="en-US" sz="1800" kern="1200" dirty="0"/>
             <a:t>Stepper Motor Turns</a:t>
           </a:r>
-          <a:endParaRPr lang="en-US" sz="1800" kern="1200" dirty="0"/>
         </a:p>
       </dsp:txBody>
       <dsp:txXfrm>
-        <a:off x="3070026" y="694"/>
-        <a:ext cx="2089546" cy="1253728"/>
+        <a:off x="3106746" y="37414"/>
+        <a:ext cx="2016106" cy="1180288"/>
       </dsp:txXfrm>
     </dsp:sp>
     <dsp:sp modelId="{860429DE-097C-43F0-90FA-60237F5E3952}">
@@ -2359,7 +2327,7 @@
         </a:bodyPr>
         <a:lstStyle/>
         <a:p>
-          <a:pPr lvl="0" algn="ctr" defTabSz="800100">
+          <a:pPr marL="0" lvl="0" indent="0" algn="ctr" defTabSz="800100">
             <a:lnSpc>
               <a:spcPct val="90000"/>
             </a:lnSpc>
@@ -2369,17 +2337,17 @@
             <a:spcAft>
               <a:spcPct val="35000"/>
             </a:spcAft>
+            <a:buNone/>
           </a:pPr>
           <a:r>
-            <a:rPr lang="en-US" sz="1800" kern="1200" dirty="0" smtClean="0"/>
+            <a:rPr lang="en-US" sz="1800" kern="1200" dirty="0"/>
             <a:t>Reads next move</a:t>
           </a:r>
-          <a:endParaRPr lang="en-US" sz="1800" kern="1200" dirty="0"/>
         </a:p>
       </dsp:txBody>
       <dsp:txXfrm>
-        <a:off x="5827100" y="0"/>
-        <a:ext cx="2089546" cy="1253728"/>
+        <a:off x="5863820" y="36720"/>
+        <a:ext cx="2016106" cy="1180288"/>
       </dsp:txXfrm>
     </dsp:sp>
     <dsp:sp modelId="{0820BC7F-BB34-4E12-A0CA-BD65E64E9C82}">
@@ -2480,7 +2448,7 @@
         </a:bodyPr>
         <a:lstStyle/>
         <a:p>
-          <a:pPr lvl="0" algn="ctr" defTabSz="800100">
+          <a:pPr marL="0" lvl="0" indent="0" algn="ctr" defTabSz="800100">
             <a:lnSpc>
               <a:spcPct val="90000"/>
             </a:lnSpc>
@@ -2490,17 +2458,17 @@
             <a:spcAft>
               <a:spcPct val="35000"/>
             </a:spcAft>
+            <a:buNone/>
           </a:pPr>
           <a:r>
-            <a:rPr lang="en-US" sz="1800" kern="1200" dirty="0" smtClean="0"/>
+            <a:rPr lang="en-US" sz="1800" kern="1200" dirty="0"/>
             <a:t>Stepper Motor Turns Again</a:t>
           </a:r>
-          <a:endParaRPr lang="en-US" sz="1800" kern="1200" dirty="0"/>
         </a:p>
       </dsp:txBody>
       <dsp:txXfrm>
-        <a:off x="5867407" y="1646237"/>
-        <a:ext cx="2089546" cy="1253728"/>
+        <a:off x="5904127" y="1682957"/>
+        <a:ext cx="2016106" cy="1180288"/>
       </dsp:txXfrm>
     </dsp:sp>
     <dsp:sp modelId="{C3F616F6-87F1-4314-A8F6-477B8211574A}">
@@ -2559,7 +2527,7 @@
         </a:bodyPr>
         <a:lstStyle/>
         <a:p>
-          <a:pPr lvl="0" algn="ctr" defTabSz="800100">
+          <a:pPr marL="0" lvl="0" indent="0" algn="ctr" defTabSz="800100">
             <a:lnSpc>
               <a:spcPct val="90000"/>
             </a:lnSpc>
@@ -2569,17 +2537,17 @@
             <a:spcAft>
               <a:spcPct val="35000"/>
             </a:spcAft>
+            <a:buNone/>
           </a:pPr>
           <a:r>
-            <a:rPr lang="en-US" sz="1800" kern="1200" dirty="0" smtClean="0"/>
+            <a:rPr lang="en-US" sz="1800" kern="1200" dirty="0"/>
             <a:t>Repeats Process until all moves are done and cube is solved</a:t>
           </a:r>
-          <a:endParaRPr lang="en-US" sz="1800" kern="1200" dirty="0"/>
         </a:p>
       </dsp:txBody>
       <dsp:txXfrm>
-        <a:off x="5849123" y="3135014"/>
-        <a:ext cx="2089546" cy="1253728"/>
+        <a:off x="5885843" y="3171734"/>
+        <a:ext cx="2016106" cy="1180288"/>
       </dsp:txXfrm>
     </dsp:sp>
   </dsp:spTree>
@@ -3940,10 +3908,9 @@
           </a:lstStyle>
           <a:p>
             <a:r>
-              <a:rPr kumimoji="0" lang="en-US" smtClean="0"/>
+              <a:rPr kumimoji="0" lang="en-US"/>
               <a:t>Click to edit Master title style</a:t>
             </a:r>
-            <a:endParaRPr kumimoji="0" lang="en-US"/>
           </a:p>
         </p:txBody>
       </p:sp>
@@ -4001,10 +3968,9 @@
           </a:lstStyle>
           <a:p>
             <a:r>
-              <a:rPr kumimoji="0" lang="en-US" smtClean="0"/>
+              <a:rPr kumimoji="0" lang="en-US"/>
               <a:t>Click to edit Master subtitle style</a:t>
             </a:r>
-            <a:endParaRPr kumimoji="0" lang="en-US"/>
           </a:p>
         </p:txBody>
       </p:sp>
@@ -4025,7 +3991,7 @@
           <a:p>
             <a:fld id="{AE8CB5DB-D002-41A9-A594-CACCDA3CE524}" type="datetimeFigureOut">
               <a:rPr lang="en-US" smtClean="0"/>
-              <a:t>8/4/2016</a:t>
+              <a:t>8/5/2016</a:t>
             </a:fld>
             <a:endParaRPr lang="en-US"/>
           </a:p>
@@ -4114,10 +4080,9 @@
           <a:lstStyle/>
           <a:p>
             <a:r>
-              <a:rPr kumimoji="0" lang="en-US" smtClean="0"/>
+              <a:rPr kumimoji="0" lang="en-US"/>
               <a:t>Click to edit Master title style</a:t>
             </a:r>
-            <a:endParaRPr kumimoji="0" lang="en-US"/>
           </a:p>
         </p:txBody>
       </p:sp>
@@ -4138,35 +4103,35 @@
           <a:p>
             <a:pPr lvl="0" eaLnBrk="1" latinLnBrk="0" hangingPunct="1"/>
             <a:r>
-              <a:rPr lang="en-US" smtClean="0"/>
+              <a:rPr lang="en-US"/>
               <a:t>Click to edit Master text styles</a:t>
             </a:r>
           </a:p>
           <a:p>
             <a:pPr lvl="1" eaLnBrk="1" latinLnBrk="0" hangingPunct="1"/>
             <a:r>
-              <a:rPr lang="en-US" smtClean="0"/>
+              <a:rPr lang="en-US"/>
               <a:t>Second level</a:t>
             </a:r>
           </a:p>
           <a:p>
             <a:pPr lvl="2" eaLnBrk="1" latinLnBrk="0" hangingPunct="1"/>
             <a:r>
-              <a:rPr lang="en-US" smtClean="0"/>
+              <a:rPr lang="en-US"/>
               <a:t>Third level</a:t>
             </a:r>
           </a:p>
           <a:p>
             <a:pPr lvl="3" eaLnBrk="1" latinLnBrk="0" hangingPunct="1"/>
             <a:r>
-              <a:rPr lang="en-US" smtClean="0"/>
+              <a:rPr lang="en-US"/>
               <a:t>Fourth level</a:t>
             </a:r>
           </a:p>
           <a:p>
             <a:pPr lvl="4" eaLnBrk="1" latinLnBrk="0" hangingPunct="1"/>
             <a:r>
-              <a:rPr lang="en-US" smtClean="0"/>
+              <a:rPr lang="en-US"/>
               <a:t>Fifth level</a:t>
             </a:r>
             <a:endParaRPr kumimoji="0" lang="en-US"/>
@@ -4190,7 +4155,7 @@
           <a:p>
             <a:fld id="{AE8CB5DB-D002-41A9-A594-CACCDA3CE524}" type="datetimeFigureOut">
               <a:rPr lang="en-US" smtClean="0"/>
-              <a:t>8/4/2016</a:t>
+              <a:t>8/5/2016</a:t>
             </a:fld>
             <a:endParaRPr lang="en-US"/>
           </a:p>
@@ -4284,10 +4249,9 @@
           <a:lstStyle/>
           <a:p>
             <a:r>
-              <a:rPr kumimoji="0" lang="en-US" smtClean="0"/>
+              <a:rPr kumimoji="0" lang="en-US"/>
               <a:t>Click to edit Master title style</a:t>
             </a:r>
-            <a:endParaRPr kumimoji="0" lang="en-US"/>
           </a:p>
         </p:txBody>
       </p:sp>
@@ -4313,35 +4277,35 @@
           <a:p>
             <a:pPr lvl="0" eaLnBrk="1" latinLnBrk="0" hangingPunct="1"/>
             <a:r>
-              <a:rPr lang="en-US" smtClean="0"/>
+              <a:rPr lang="en-US"/>
               <a:t>Click to edit Master text styles</a:t>
             </a:r>
           </a:p>
           <a:p>
             <a:pPr lvl="1" eaLnBrk="1" latinLnBrk="0" hangingPunct="1"/>
             <a:r>
-              <a:rPr lang="en-US" smtClean="0"/>
+              <a:rPr lang="en-US"/>
               <a:t>Second level</a:t>
             </a:r>
           </a:p>
           <a:p>
             <a:pPr lvl="2" eaLnBrk="1" latinLnBrk="0" hangingPunct="1"/>
             <a:r>
-              <a:rPr lang="en-US" smtClean="0"/>
+              <a:rPr lang="en-US"/>
               <a:t>Third level</a:t>
             </a:r>
           </a:p>
           <a:p>
             <a:pPr lvl="3" eaLnBrk="1" latinLnBrk="0" hangingPunct="1"/>
             <a:r>
-              <a:rPr lang="en-US" smtClean="0"/>
+              <a:rPr lang="en-US"/>
               <a:t>Fourth level</a:t>
             </a:r>
           </a:p>
           <a:p>
             <a:pPr lvl="4" eaLnBrk="1" latinLnBrk="0" hangingPunct="1"/>
             <a:r>
-              <a:rPr lang="en-US" smtClean="0"/>
+              <a:rPr lang="en-US"/>
               <a:t>Fifth level</a:t>
             </a:r>
             <a:endParaRPr kumimoji="0" lang="en-US"/>
@@ -4365,7 +4329,7 @@
           <a:p>
             <a:fld id="{AE8CB5DB-D002-41A9-A594-CACCDA3CE524}" type="datetimeFigureOut">
               <a:rPr lang="en-US" smtClean="0"/>
-              <a:t>8/4/2016</a:t>
+              <a:t>8/5/2016</a:t>
             </a:fld>
             <a:endParaRPr lang="en-US"/>
           </a:p>
@@ -4454,10 +4418,9 @@
           <a:lstStyle/>
           <a:p>
             <a:r>
-              <a:rPr kumimoji="0" lang="en-US" smtClean="0"/>
+              <a:rPr kumimoji="0" lang="en-US"/>
               <a:t>Click to edit Master title style</a:t>
             </a:r>
-            <a:endParaRPr kumimoji="0" lang="en-US"/>
           </a:p>
         </p:txBody>
       </p:sp>
@@ -4478,35 +4441,35 @@
           <a:p>
             <a:pPr lvl="0" eaLnBrk="1" latinLnBrk="0" hangingPunct="1"/>
             <a:r>
-              <a:rPr lang="en-US" smtClean="0"/>
+              <a:rPr lang="en-US"/>
               <a:t>Click to edit Master text styles</a:t>
             </a:r>
           </a:p>
           <a:p>
             <a:pPr lvl="1" eaLnBrk="1" latinLnBrk="0" hangingPunct="1"/>
             <a:r>
-              <a:rPr lang="en-US" smtClean="0"/>
+              <a:rPr lang="en-US"/>
               <a:t>Second level</a:t>
             </a:r>
           </a:p>
           <a:p>
             <a:pPr lvl="2" eaLnBrk="1" latinLnBrk="0" hangingPunct="1"/>
             <a:r>
-              <a:rPr lang="en-US" smtClean="0"/>
+              <a:rPr lang="en-US"/>
               <a:t>Third level</a:t>
             </a:r>
           </a:p>
           <a:p>
             <a:pPr lvl="3" eaLnBrk="1" latinLnBrk="0" hangingPunct="1"/>
             <a:r>
-              <a:rPr lang="en-US" smtClean="0"/>
+              <a:rPr lang="en-US"/>
               <a:t>Fourth level</a:t>
             </a:r>
           </a:p>
           <a:p>
             <a:pPr lvl="4" eaLnBrk="1" latinLnBrk="0" hangingPunct="1"/>
             <a:r>
-              <a:rPr lang="en-US" smtClean="0"/>
+              <a:rPr lang="en-US"/>
               <a:t>Fifth level</a:t>
             </a:r>
             <a:endParaRPr kumimoji="0" lang="en-US"/>
@@ -4530,7 +4493,7 @@
           <a:p>
             <a:fld id="{AE8CB5DB-D002-41A9-A594-CACCDA3CE524}" type="datetimeFigureOut">
               <a:rPr lang="en-US" smtClean="0"/>
-              <a:t>8/4/2016</a:t>
+              <a:t>8/5/2016</a:t>
             </a:fld>
             <a:endParaRPr lang="en-US"/>
           </a:p>
@@ -4671,10 +4634,9 @@
           </a:lstStyle>
           <a:p>
             <a:r>
-              <a:rPr kumimoji="0" lang="en-US" smtClean="0"/>
+              <a:rPr kumimoji="0" lang="en-US"/>
               <a:t>Click to edit Master title style</a:t>
             </a:r>
-            <a:endParaRPr kumimoji="0" lang="en-US"/>
           </a:p>
         </p:txBody>
       </p:sp>
@@ -4749,7 +4711,7 @@
           <a:p>
             <a:pPr lvl="0" eaLnBrk="1" latinLnBrk="0" hangingPunct="1"/>
             <a:r>
-              <a:rPr kumimoji="0" lang="en-US" smtClean="0"/>
+              <a:rPr kumimoji="0" lang="en-US"/>
               <a:t>Click to edit Master text styles</a:t>
             </a:r>
           </a:p>
@@ -4772,7 +4734,7 @@
           <a:p>
             <a:fld id="{AE8CB5DB-D002-41A9-A594-CACCDA3CE524}" type="datetimeFigureOut">
               <a:rPr lang="en-US" smtClean="0"/>
-              <a:t>8/4/2016</a:t>
+              <a:t>8/5/2016</a:t>
             </a:fld>
             <a:endParaRPr lang="en-US"/>
           </a:p>
@@ -4866,10 +4828,9 @@
           <a:lstStyle/>
           <a:p>
             <a:r>
-              <a:rPr kumimoji="0" lang="en-US" smtClean="0"/>
+              <a:rPr kumimoji="0" lang="en-US"/>
               <a:t>Click to edit Master title style</a:t>
             </a:r>
-            <a:endParaRPr kumimoji="0" lang="en-US"/>
           </a:p>
         </p:txBody>
       </p:sp>
@@ -4911,35 +4872,35 @@
           <a:p>
             <a:pPr lvl="0" eaLnBrk="1" latinLnBrk="0" hangingPunct="1"/>
             <a:r>
-              <a:rPr lang="en-US" smtClean="0"/>
+              <a:rPr lang="en-US"/>
               <a:t>Click to edit Master text styles</a:t>
             </a:r>
           </a:p>
           <a:p>
             <a:pPr lvl="1" eaLnBrk="1" latinLnBrk="0" hangingPunct="1"/>
             <a:r>
-              <a:rPr lang="en-US" smtClean="0"/>
+              <a:rPr lang="en-US"/>
               <a:t>Second level</a:t>
             </a:r>
           </a:p>
           <a:p>
             <a:pPr lvl="2" eaLnBrk="1" latinLnBrk="0" hangingPunct="1"/>
             <a:r>
-              <a:rPr lang="en-US" smtClean="0"/>
+              <a:rPr lang="en-US"/>
               <a:t>Third level</a:t>
             </a:r>
           </a:p>
           <a:p>
             <a:pPr lvl="3" eaLnBrk="1" latinLnBrk="0" hangingPunct="1"/>
             <a:r>
-              <a:rPr lang="en-US" smtClean="0"/>
+              <a:rPr lang="en-US"/>
               <a:t>Fourth level</a:t>
             </a:r>
           </a:p>
           <a:p>
             <a:pPr lvl="4" eaLnBrk="1" latinLnBrk="0" hangingPunct="1"/>
             <a:r>
-              <a:rPr lang="en-US" smtClean="0"/>
+              <a:rPr lang="en-US"/>
               <a:t>Fifth level</a:t>
             </a:r>
             <a:endParaRPr kumimoji="0" lang="en-US"/>
@@ -4984,35 +4945,35 @@
           <a:p>
             <a:pPr lvl="0" eaLnBrk="1" latinLnBrk="0" hangingPunct="1"/>
             <a:r>
-              <a:rPr lang="en-US" smtClean="0"/>
+              <a:rPr lang="en-US"/>
               <a:t>Click to edit Master text styles</a:t>
             </a:r>
           </a:p>
           <a:p>
             <a:pPr lvl="1" eaLnBrk="1" latinLnBrk="0" hangingPunct="1"/>
             <a:r>
-              <a:rPr lang="en-US" smtClean="0"/>
+              <a:rPr lang="en-US"/>
               <a:t>Second level</a:t>
             </a:r>
           </a:p>
           <a:p>
             <a:pPr lvl="2" eaLnBrk="1" latinLnBrk="0" hangingPunct="1"/>
             <a:r>
-              <a:rPr lang="en-US" smtClean="0"/>
+              <a:rPr lang="en-US"/>
               <a:t>Third level</a:t>
             </a:r>
           </a:p>
           <a:p>
             <a:pPr lvl="3" eaLnBrk="1" latinLnBrk="0" hangingPunct="1"/>
             <a:r>
-              <a:rPr lang="en-US" smtClean="0"/>
+              <a:rPr lang="en-US"/>
               <a:t>Fourth level</a:t>
             </a:r>
           </a:p>
           <a:p>
             <a:pPr lvl="4" eaLnBrk="1" latinLnBrk="0" hangingPunct="1"/>
             <a:r>
-              <a:rPr lang="en-US" smtClean="0"/>
+              <a:rPr lang="en-US"/>
               <a:t>Fifth level</a:t>
             </a:r>
             <a:endParaRPr kumimoji="0" lang="en-US"/>
@@ -5036,7 +4997,7 @@
           <a:p>
             <a:fld id="{AE8CB5DB-D002-41A9-A594-CACCDA3CE524}" type="datetimeFigureOut">
               <a:rPr lang="en-US" smtClean="0"/>
-              <a:t>8/4/2016</a:t>
+              <a:t>8/5/2016</a:t>
             </a:fld>
             <a:endParaRPr lang="en-US"/>
           </a:p>
@@ -5134,10 +5095,9 @@
           </a:lstStyle>
           <a:p>
             <a:r>
-              <a:rPr kumimoji="0" lang="en-US" smtClean="0"/>
+              <a:rPr kumimoji="0" lang="en-US"/>
               <a:t>Click to edit Master title style</a:t>
             </a:r>
-            <a:endParaRPr kumimoji="0" lang="en-US"/>
           </a:p>
         </p:txBody>
       </p:sp>
@@ -5191,7 +5151,7 @@
           <a:p>
             <a:pPr lvl="0" eaLnBrk="1" latinLnBrk="0" hangingPunct="1"/>
             <a:r>
-              <a:rPr kumimoji="0" lang="en-US" smtClean="0"/>
+              <a:rPr kumimoji="0" lang="en-US"/>
               <a:t>Click to edit Master text styles</a:t>
             </a:r>
           </a:p>
@@ -5245,7 +5205,7 @@
           <a:p>
             <a:pPr lvl="0" eaLnBrk="1" latinLnBrk="0" hangingPunct="1"/>
             <a:r>
-              <a:rPr kumimoji="0" lang="en-US" smtClean="0"/>
+              <a:rPr kumimoji="0" lang="en-US"/>
               <a:t>Click to edit Master text styles</a:t>
             </a:r>
           </a:p>
@@ -5289,35 +5249,35 @@
           <a:p>
             <a:pPr lvl="0" eaLnBrk="1" latinLnBrk="0" hangingPunct="1"/>
             <a:r>
-              <a:rPr lang="en-US" smtClean="0"/>
+              <a:rPr lang="en-US"/>
               <a:t>Click to edit Master text styles</a:t>
             </a:r>
           </a:p>
           <a:p>
             <a:pPr lvl="1" eaLnBrk="1" latinLnBrk="0" hangingPunct="1"/>
             <a:r>
-              <a:rPr lang="en-US" smtClean="0"/>
+              <a:rPr lang="en-US"/>
               <a:t>Second level</a:t>
             </a:r>
           </a:p>
           <a:p>
             <a:pPr lvl="2" eaLnBrk="1" latinLnBrk="0" hangingPunct="1"/>
             <a:r>
-              <a:rPr lang="en-US" smtClean="0"/>
+              <a:rPr lang="en-US"/>
               <a:t>Third level</a:t>
             </a:r>
           </a:p>
           <a:p>
             <a:pPr lvl="3" eaLnBrk="1" latinLnBrk="0" hangingPunct="1"/>
             <a:r>
-              <a:rPr lang="en-US" smtClean="0"/>
+              <a:rPr lang="en-US"/>
               <a:t>Fourth level</a:t>
             </a:r>
           </a:p>
           <a:p>
             <a:pPr lvl="4" eaLnBrk="1" latinLnBrk="0" hangingPunct="1"/>
             <a:r>
-              <a:rPr lang="en-US" smtClean="0"/>
+              <a:rPr lang="en-US"/>
               <a:t>Fifth level</a:t>
             </a:r>
             <a:endParaRPr kumimoji="0" lang="en-US"/>
@@ -5362,35 +5322,35 @@
           <a:p>
             <a:pPr lvl="0" eaLnBrk="1" latinLnBrk="0" hangingPunct="1"/>
             <a:r>
-              <a:rPr lang="en-US" smtClean="0"/>
+              <a:rPr lang="en-US"/>
               <a:t>Click to edit Master text styles</a:t>
             </a:r>
           </a:p>
           <a:p>
             <a:pPr lvl="1" eaLnBrk="1" latinLnBrk="0" hangingPunct="1"/>
             <a:r>
-              <a:rPr lang="en-US" smtClean="0"/>
+              <a:rPr lang="en-US"/>
               <a:t>Second level</a:t>
             </a:r>
           </a:p>
           <a:p>
             <a:pPr lvl="2" eaLnBrk="1" latinLnBrk="0" hangingPunct="1"/>
             <a:r>
-              <a:rPr lang="en-US" smtClean="0"/>
+              <a:rPr lang="en-US"/>
               <a:t>Third level</a:t>
             </a:r>
           </a:p>
           <a:p>
             <a:pPr lvl="3" eaLnBrk="1" latinLnBrk="0" hangingPunct="1"/>
             <a:r>
-              <a:rPr lang="en-US" smtClean="0"/>
+              <a:rPr lang="en-US"/>
               <a:t>Fourth level</a:t>
             </a:r>
           </a:p>
           <a:p>
             <a:pPr lvl="4" eaLnBrk="1" latinLnBrk="0" hangingPunct="1"/>
             <a:r>
-              <a:rPr lang="en-US" smtClean="0"/>
+              <a:rPr lang="en-US"/>
               <a:t>Fifth level</a:t>
             </a:r>
             <a:endParaRPr kumimoji="0" lang="en-US"/>
@@ -5414,7 +5374,7 @@
           <a:p>
             <a:fld id="{AE8CB5DB-D002-41A9-A594-CACCDA3CE524}" type="datetimeFigureOut">
               <a:rPr lang="en-US" smtClean="0"/>
-              <a:t>8/4/2016</a:t>
+              <a:t>8/5/2016</a:t>
             </a:fld>
             <a:endParaRPr lang="en-US"/>
           </a:p>
@@ -5540,10 +5500,9 @@
           </a:lstStyle>
           <a:p>
             <a:r>
-              <a:rPr kumimoji="0" lang="en-US" smtClean="0"/>
+              <a:rPr kumimoji="0" lang="en-US"/>
               <a:t>Click to edit Master title style</a:t>
             </a:r>
-            <a:endParaRPr kumimoji="0" lang="en-US"/>
           </a:p>
         </p:txBody>
       </p:sp>
@@ -5564,7 +5523,7 @@
           <a:p>
             <a:fld id="{AE8CB5DB-D002-41A9-A594-CACCDA3CE524}" type="datetimeFigureOut">
               <a:rPr lang="en-US" smtClean="0"/>
-              <a:t>8/4/2016</a:t>
+              <a:t>8/5/2016</a:t>
             </a:fld>
             <a:endParaRPr lang="en-US"/>
           </a:p>
@@ -5654,7 +5613,7 @@
           <a:p>
             <a:fld id="{AE8CB5DB-D002-41A9-A594-CACCDA3CE524}" type="datetimeFigureOut">
               <a:rPr lang="en-US" smtClean="0"/>
-              <a:t>8/4/2016</a:t>
+              <a:t>8/5/2016</a:t>
             </a:fld>
             <a:endParaRPr lang="en-US"/>
           </a:p>
@@ -5769,10 +5728,9 @@
           </a:lstStyle>
           <a:p>
             <a:r>
-              <a:rPr kumimoji="0" lang="en-US" smtClean="0"/>
+              <a:rPr kumimoji="0" lang="en-US"/>
               <a:t>Click to edit Master title style</a:t>
             </a:r>
-            <a:endParaRPr kumimoji="0" lang="en-US"/>
           </a:p>
         </p:txBody>
       </p:sp>
@@ -5819,7 +5777,7 @@
           <a:p>
             <a:pPr lvl="0" eaLnBrk="1" latinLnBrk="0" hangingPunct="1"/>
             <a:r>
-              <a:rPr kumimoji="0" lang="en-US" smtClean="0"/>
+              <a:rPr kumimoji="0" lang="en-US"/>
               <a:t>Click to edit Master text styles</a:t>
             </a:r>
           </a:p>
@@ -5863,35 +5821,35 @@
           <a:p>
             <a:pPr lvl="0" eaLnBrk="1" latinLnBrk="0" hangingPunct="1"/>
             <a:r>
-              <a:rPr lang="en-US" smtClean="0"/>
+              <a:rPr lang="en-US"/>
               <a:t>Click to edit Master text styles</a:t>
             </a:r>
           </a:p>
           <a:p>
             <a:pPr lvl="1" eaLnBrk="1" latinLnBrk="0" hangingPunct="1"/>
             <a:r>
-              <a:rPr lang="en-US" smtClean="0"/>
+              <a:rPr lang="en-US"/>
               <a:t>Second level</a:t>
             </a:r>
           </a:p>
           <a:p>
             <a:pPr lvl="2" eaLnBrk="1" latinLnBrk="0" hangingPunct="1"/>
             <a:r>
-              <a:rPr lang="en-US" smtClean="0"/>
+              <a:rPr lang="en-US"/>
               <a:t>Third level</a:t>
             </a:r>
           </a:p>
           <a:p>
             <a:pPr lvl="3" eaLnBrk="1" latinLnBrk="0" hangingPunct="1"/>
             <a:r>
-              <a:rPr lang="en-US" smtClean="0"/>
+              <a:rPr lang="en-US"/>
               <a:t>Fourth level</a:t>
             </a:r>
           </a:p>
           <a:p>
             <a:pPr lvl="4" eaLnBrk="1" latinLnBrk="0" hangingPunct="1"/>
             <a:r>
-              <a:rPr lang="en-US" smtClean="0"/>
+              <a:rPr lang="en-US"/>
               <a:t>Fifth level</a:t>
             </a:r>
             <a:endParaRPr kumimoji="0" lang="en-US"/>
@@ -5915,7 +5873,7 @@
           <a:p>
             <a:fld id="{AE8CB5DB-D002-41A9-A594-CACCDA3CE524}" type="datetimeFigureOut">
               <a:rPr lang="en-US" smtClean="0"/>
-              <a:t>8/4/2016</a:t>
+              <a:t>8/5/2016</a:t>
             </a:fld>
             <a:endParaRPr lang="en-US"/>
           </a:p>
@@ -6130,10 +6088,9 @@
           </a:lstStyle>
           <a:p>
             <a:r>
-              <a:rPr kumimoji="0" lang="en-US" smtClean="0"/>
+              <a:rPr kumimoji="0" lang="en-US"/>
               <a:t>Click to edit Master title style</a:t>
             </a:r>
-            <a:endParaRPr kumimoji="0" lang="en-US"/>
           </a:p>
         </p:txBody>
       </p:sp>
@@ -6180,7 +6137,7 @@
           <a:p>
             <a:pPr lvl="0" eaLnBrk="1" latinLnBrk="0" hangingPunct="1"/>
             <a:r>
-              <a:rPr kumimoji="0" lang="en-US" smtClean="0"/>
+              <a:rPr kumimoji="0" lang="en-US"/>
               <a:t>Click to edit Master text styles</a:t>
             </a:r>
           </a:p>
@@ -6203,7 +6160,7 @@
           <a:p>
             <a:fld id="{AE8CB5DB-D002-41A9-A594-CACCDA3CE524}" type="datetimeFigureOut">
               <a:rPr lang="en-US" smtClean="0"/>
-              <a:t>8/4/2016</a:t>
+              <a:t>8/5/2016</a:t>
             </a:fld>
             <a:endParaRPr lang="en-US"/>
           </a:p>
@@ -6295,7 +6252,7 @@
           </a:lstStyle>
           <a:p>
             <a:r>
-              <a:rPr kumimoji="0" lang="en-US" smtClean="0"/>
+              <a:rPr kumimoji="0" lang="en-US"/>
               <a:t>Click icon to add picture</a:t>
             </a:r>
             <a:endParaRPr kumimoji="0" lang="en-US" dirty="0"/>
@@ -6870,10 +6827,9 @@
           <a:lstStyle/>
           <a:p>
             <a:r>
-              <a:rPr kumimoji="0" lang="en-US" smtClean="0"/>
+              <a:rPr kumimoji="0" lang="en-US"/>
               <a:t>Click to edit Master title style</a:t>
             </a:r>
-            <a:endParaRPr kumimoji="0" lang="en-US"/>
           </a:p>
         </p:txBody>
       </p:sp>
@@ -6904,38 +6860,37 @@
           <a:p>
             <a:pPr lvl="0" eaLnBrk="1" latinLnBrk="0" hangingPunct="1"/>
             <a:r>
-              <a:rPr kumimoji="0" lang="en-US" smtClean="0"/>
+              <a:rPr kumimoji="0" lang="en-US"/>
               <a:t>Click to edit Master text styles</a:t>
             </a:r>
           </a:p>
           <a:p>
             <a:pPr lvl="1" eaLnBrk="1" latinLnBrk="0" hangingPunct="1"/>
             <a:r>
-              <a:rPr kumimoji="0" lang="en-US" smtClean="0"/>
+              <a:rPr kumimoji="0" lang="en-US"/>
               <a:t>Second level</a:t>
             </a:r>
           </a:p>
           <a:p>
             <a:pPr lvl="2" eaLnBrk="1" latinLnBrk="0" hangingPunct="1"/>
             <a:r>
-              <a:rPr kumimoji="0" lang="en-US" smtClean="0"/>
+              <a:rPr kumimoji="0" lang="en-US"/>
               <a:t>Third level</a:t>
             </a:r>
           </a:p>
           <a:p>
             <a:pPr lvl="3" eaLnBrk="1" latinLnBrk="0" hangingPunct="1"/>
             <a:r>
-              <a:rPr kumimoji="0" lang="en-US" smtClean="0"/>
+              <a:rPr kumimoji="0" lang="en-US"/>
               <a:t>Fourth level</a:t>
             </a:r>
           </a:p>
           <a:p>
             <a:pPr lvl="4" eaLnBrk="1" latinLnBrk="0" hangingPunct="1"/>
             <a:r>
-              <a:rPr kumimoji="0" lang="en-US" smtClean="0"/>
+              <a:rPr kumimoji="0" lang="en-US"/>
               <a:t>Fifth level</a:t>
             </a:r>
-            <a:endParaRPr kumimoji="0" lang="en-US"/>
           </a:p>
         </p:txBody>
       </p:sp>
@@ -6974,7 +6929,7 @@
           <a:p>
             <a:fld id="{AE8CB5DB-D002-41A9-A594-CACCDA3CE524}" type="datetimeFigureOut">
               <a:rPr lang="en-US" smtClean="0"/>
-              <a:t>8/4/2016</a:t>
+              <a:t>8/5/2016</a:t>
             </a:fld>
             <a:endParaRPr lang="en-US"/>
           </a:p>
@@ -7613,11 +7568,11 @@
           <a:lstStyle/>
           <a:p>
             <a:r>
-              <a:rPr lang="en-US" dirty="0" smtClean="0"/>
+              <a:rPr lang="en-US" dirty="0"/>
               <a:t>Cube </a:t>
             </a:r>
             <a:r>
-              <a:rPr lang="en-US" dirty="0" err="1" smtClean="0"/>
+              <a:rPr lang="en-US" dirty="0" err="1"/>
               <a:t>Bot</a:t>
             </a:r>
             <a:endParaRPr lang="en-US" dirty="0"/>
@@ -7645,10 +7600,9 @@
           <a:lstStyle/>
           <a:p>
             <a:r>
-              <a:rPr lang="en-US" dirty="0" smtClean="0"/>
+              <a:rPr lang="en-US" dirty="0"/>
               <a:t>Solving the Rubik's cube with robotics</a:t>
             </a:r>
-            <a:endParaRPr lang="en-US" dirty="0"/>
           </a:p>
         </p:txBody>
       </p:sp>
@@ -7724,10 +7678,9 @@
           <a:lstStyle/>
           <a:p>
             <a:r>
-              <a:rPr lang="en-US" dirty="0" smtClean="0"/>
+              <a:rPr lang="en-US" dirty="0"/>
               <a:t>Thank You</a:t>
             </a:r>
-            <a:endParaRPr lang="en-US" dirty="0"/>
           </a:p>
         </p:txBody>
       </p:sp>
@@ -7772,10 +7725,9 @@
           <a:lstStyle/>
           <a:p>
             <a:r>
-              <a:rPr lang="en-US" dirty="0" smtClean="0"/>
+              <a:rPr lang="en-US" dirty="0"/>
               <a:t>Goals</a:t>
             </a:r>
-            <a:endParaRPr lang="en-US" dirty="0"/>
           </a:p>
         </p:txBody>
       </p:sp>
@@ -7800,21 +7752,13 @@
           <a:lstStyle/>
           <a:p>
             <a:r>
-              <a:rPr lang="en-US" dirty="0" smtClean="0"/>
-              <a:t>Robot that can solve the </a:t>
-            </a:r>
-            <a:r>
               <a:rPr lang="en-US" dirty="0"/>
-              <a:t>R</a:t>
-            </a:r>
-            <a:r>
-              <a:rPr lang="en-US" dirty="0" smtClean="0"/>
-              <a:t>ubik’s cube from any given position</a:t>
-            </a:r>
-          </a:p>
-          <a:p>
-            <a:r>
-              <a:rPr lang="en-US" dirty="0" smtClean="0"/>
+              <a:t>Robot that can solve the Rubik’s cube from any given position</a:t>
+            </a:r>
+          </a:p>
+          <a:p>
+            <a:r>
+              <a:rPr lang="en-US" dirty="0"/>
               <a:t>Acts as a reference for solving by hand</a:t>
             </a:r>
           </a:p>
@@ -7864,10 +7808,9 @@
           <a:lstStyle/>
           <a:p>
             <a:r>
-              <a:rPr lang="en-US" dirty="0" smtClean="0"/>
+              <a:rPr lang="en-US" dirty="0"/>
               <a:t>3D Modeling the frame</a:t>
             </a:r>
-            <a:endParaRPr lang="en-US" dirty="0"/>
           </a:p>
         </p:txBody>
       </p:sp>
@@ -7892,20 +7835,19 @@
           <a:lstStyle/>
           <a:p>
             <a:r>
-              <a:rPr lang="en-US" dirty="0" err="1" smtClean="0"/>
+              <a:rPr lang="en-US" dirty="0" err="1"/>
               <a:t>SolidWorks</a:t>
             </a:r>
             <a:r>
-              <a:rPr lang="en-US" dirty="0" smtClean="0"/>
+              <a:rPr lang="en-US" dirty="0"/>
               <a:t> </a:t>
             </a:r>
           </a:p>
           <a:p>
             <a:r>
-              <a:rPr lang="en-US" dirty="0" smtClean="0"/>
+              <a:rPr lang="en-US" dirty="0"/>
               <a:t>Created base, 4 sides, and top from laser-cut acrylic</a:t>
             </a:r>
-            <a:endParaRPr lang="en-US" dirty="0"/>
           </a:p>
         </p:txBody>
       </p:sp>
@@ -7976,10 +7918,9 @@
           <a:lstStyle/>
           <a:p>
             <a:r>
-              <a:rPr lang="en-US" dirty="0" smtClean="0"/>
+              <a:rPr lang="en-US" dirty="0"/>
               <a:t>Attachments</a:t>
             </a:r>
-            <a:endParaRPr lang="en-US" dirty="0"/>
           </a:p>
         </p:txBody>
       </p:sp>
@@ -8005,17 +7946,16 @@
           <a:p>
             <a:pPr lvl="1"/>
             <a:r>
-              <a:rPr lang="en-US" dirty="0" smtClean="0"/>
+              <a:rPr lang="en-US" dirty="0"/>
               <a:t>Aluminum </a:t>
             </a:r>
           </a:p>
           <a:p>
             <a:pPr lvl="1"/>
             <a:r>
-              <a:rPr lang="en-US" dirty="0" smtClean="0"/>
+              <a:rPr lang="en-US" dirty="0"/>
               <a:t>Wood</a:t>
             </a:r>
-            <a:endParaRPr lang="en-US" dirty="0"/>
           </a:p>
         </p:txBody>
       </p:sp>
@@ -8260,10 +8200,9 @@
           <a:lstStyle/>
           <a:p>
             <a:r>
-              <a:rPr lang="en-US" dirty="0" smtClean="0"/>
+              <a:rPr lang="en-US" dirty="0"/>
               <a:t>Getting Stepper Motors Running</a:t>
             </a:r>
-            <a:endParaRPr lang="en-US" dirty="0"/>
           </a:p>
         </p:txBody>
       </p:sp>
@@ -8290,20 +8229,19 @@
             <a:pPr>
               <a:buNone/>
             </a:pPr>
-            <a:endParaRPr lang="en-US" dirty="0" smtClean="0"/>
-          </a:p>
-          <a:p>
-            <a:r>
-              <a:rPr lang="en-US" dirty="0" smtClean="0"/>
+            <a:endParaRPr lang="en-US" dirty="0"/>
+          </a:p>
+          <a:p>
+            <a:r>
+              <a:rPr lang="en-US" dirty="0"/>
               <a:t>Wiring </a:t>
             </a:r>
           </a:p>
           <a:p>
             <a:r>
-              <a:rPr lang="en-US" dirty="0" smtClean="0"/>
+              <a:rPr lang="en-US" dirty="0"/>
               <a:t>Challenges</a:t>
             </a:r>
-            <a:endParaRPr lang="en-US" dirty="0"/>
           </a:p>
         </p:txBody>
       </p:sp>
@@ -8409,10 +8347,9 @@
           <a:lstStyle/>
           <a:p>
             <a:r>
-              <a:rPr lang="en-US" dirty="0" smtClean="0"/>
+              <a:rPr lang="en-US" dirty="0"/>
               <a:t>Algorithm and Issues</a:t>
             </a:r>
-            <a:endParaRPr lang="en-US" dirty="0"/>
           </a:p>
         </p:txBody>
       </p:sp>
@@ -8437,18 +8374,18 @@
           <a:lstStyle/>
           <a:p>
             <a:r>
-              <a:rPr lang="en-US" dirty="0" smtClean="0"/>
+              <a:rPr lang="en-US" dirty="0"/>
               <a:t>God’s Algorithm</a:t>
             </a:r>
           </a:p>
           <a:p>
             <a:r>
-              <a:rPr lang="en-US" dirty="0" smtClean="0"/>
+              <a:rPr lang="en-US" dirty="0"/>
               <a:t>Getting algorithm to run with Processing</a:t>
             </a:r>
           </a:p>
           <a:p>
-            <a:endParaRPr lang="en-US" dirty="0" smtClean="0"/>
+            <a:endParaRPr lang="en-US" dirty="0"/>
           </a:p>
         </p:txBody>
       </p:sp>
@@ -8519,10 +8456,9 @@
           <a:lstStyle/>
           <a:p>
             <a:r>
-              <a:rPr lang="en-US" dirty="0" smtClean="0"/>
+              <a:rPr lang="en-US" dirty="0"/>
               <a:t>Fundamental Software Logistics </a:t>
             </a:r>
-            <a:endParaRPr lang="en-US" dirty="0"/>
           </a:p>
         </p:txBody>
       </p:sp>
@@ -8587,8 +8523,8 @@
           <a:lstStyle/>
           <a:p>
             <a:r>
-              <a:rPr lang="en-US" dirty="0" smtClean="0"/>
-              <a:t>Video?</a:t>
+              <a:rPr lang="en-US"/>
+              <a:t>Video</a:t>
             </a:r>
             <a:endParaRPr lang="en-US" dirty="0"/>
           </a:p>
@@ -8609,7 +8545,16 @@
           <a:bodyPr/>
           <a:lstStyle/>
           <a:p>
-            <a:endParaRPr lang="en-US"/>
+            <a:r>
+              <a:rPr lang="en-US" dirty="0">
+                <a:hlinkClick r:id="rId2"/>
+              </a:rPr>
+              <a:t>https://www.youtube.com/watch?v=oHNqW97JLAo</a:t>
+            </a:r>
+            <a:r>
+              <a:rPr lang="en-US" dirty="0"/>
+              <a:t> </a:t>
+            </a:r>
           </a:p>
         </p:txBody>
       </p:sp>
@@ -8654,10 +8599,9 @@
           <a:lstStyle/>
           <a:p>
             <a:r>
-              <a:rPr lang="en-US" dirty="0" smtClean="0"/>
+              <a:rPr lang="en-US" dirty="0"/>
               <a:t>Demo</a:t>
             </a:r>
-            <a:endParaRPr lang="en-US" dirty="0"/>
           </a:p>
         </p:txBody>
       </p:sp>
@@ -8682,18 +8626,17 @@
           <a:lstStyle/>
           <a:p>
             <a:r>
-              <a:rPr lang="en-US" dirty="0" smtClean="0"/>
+              <a:rPr lang="en-US" dirty="0"/>
               <a:t>Now we will demonstrate the Rubik’s cube solving </a:t>
             </a:r>
             <a:r>
-              <a:rPr lang="en-US" dirty="0" err="1" smtClean="0"/>
+              <a:rPr lang="en-US" dirty="0" err="1"/>
               <a:t>bot</a:t>
             </a:r>
             <a:r>
-              <a:rPr lang="en-US" dirty="0" smtClean="0"/>
+              <a:rPr lang="en-US" dirty="0"/>
               <a:t> in action</a:t>
             </a:r>
-            <a:endParaRPr lang="en-US" dirty="0"/>
           </a:p>
         </p:txBody>
       </p:sp>

</xml_diff>